<commit_message>
Fix slide style giltch
</commit_message>
<xml_diff>
--- a/Prometheus_meetup_slide.pptx
+++ b/Prometheus_meetup_slide.pptx
@@ -221,7 +221,7 @@
           <a:p>
             <a:fld id="{0A2C6E4E-92E0-4AC1-8B2D-D1FAB06D7154}" type="datetimeFigureOut">
               <a:rPr kumimoji="1" lang="ja-JP" altLang="en-US" smtClean="0"/>
-              <a:t>2020/1/14</a:t>
+              <a:t>2020/1/15</a:t>
             </a:fld>
             <a:endParaRPr kumimoji="1" lang="ja-JP" altLang="en-US"/>
           </a:p>
@@ -4432,7 +4432,7 @@
           <a:p>
             <a:fld id="{53235D1F-0741-40E3-B9F5-9646A1C97BC9}" type="datetimeFigureOut">
               <a:rPr kumimoji="1" lang="ja-JP" altLang="en-US" smtClean="0"/>
-              <a:t>2020/1/14</a:t>
+              <a:t>2020/1/15</a:t>
             </a:fld>
             <a:endParaRPr kumimoji="1" lang="ja-JP" altLang="en-US"/>
           </a:p>
@@ -9810,8 +9810,8 @@
         </p:nvSpPr>
         <p:spPr>
           <a:xfrm>
-            <a:off x="504000" y="2942566"/>
-            <a:ext cx="9071640" cy="2250873"/>
+            <a:off x="504000" y="3209306"/>
+            <a:ext cx="9071640" cy="1717393"/>
           </a:xfrm>
         </p:spPr>
         <p:txBody>
@@ -9825,7 +9825,10 @@
             <a:endParaRPr kumimoji="1" lang="en-US" altLang="ja-JP" dirty="0"/>
           </a:p>
           <a:p>
-            <a:pPr lvl="1"/>
+            <a:pPr marL="285750" lvl="1" indent="-285750">
+              <a:buFont typeface="Arial" panose="020B0604020202020204" pitchFamily="34" charset="0"/>
+              <a:buChar char="•"/>
+            </a:pPr>
             <a:r>
               <a:rPr lang="ja-JP" altLang="en-US" dirty="0"/>
               <a:t>同じログコレクターの中の人として</a:t>
@@ -9841,7 +9844,10 @@
             <a:endParaRPr lang="en-US" altLang="ja-JP" dirty="0"/>
           </a:p>
           <a:p>
-            <a:pPr lvl="1"/>
+            <a:pPr marL="285750" lvl="1" indent="-285750">
+              <a:buFont typeface="Arial" panose="020B0604020202020204" pitchFamily="34" charset="0"/>
+              <a:buChar char="•"/>
+            </a:pPr>
             <a:r>
               <a:rPr kumimoji="1" lang="en-US" altLang="ja-JP" dirty="0" err="1"/>
               <a:t>Promtail</a:t>
@@ -9861,7 +9867,10 @@
             <a:endParaRPr kumimoji="1" lang="en-US" altLang="ja-JP" dirty="0"/>
           </a:p>
           <a:p>
-            <a:pPr lvl="2"/>
+            <a:pPr marL="285750" lvl="2" indent="-285750">
+              <a:buFont typeface="Arial" panose="020B0604020202020204" pitchFamily="34" charset="0"/>
+              <a:buChar char="•"/>
+            </a:pPr>
             <a:r>
               <a:rPr lang="en-US" altLang="ja-JP" strike="sngStrike" dirty="0" err="1"/>
               <a:t>Promtail</a:t>
@@ -9873,7 +9882,10 @@
             <a:endParaRPr lang="en-US" altLang="ja-JP" strike="sngStrike" dirty="0"/>
           </a:p>
           <a:p>
-            <a:pPr lvl="1"/>
+            <a:pPr marL="285750" lvl="1" indent="-285750">
+              <a:buFont typeface="Arial" panose="020B0604020202020204" pitchFamily="34" charset="0"/>
+              <a:buChar char="•"/>
+            </a:pPr>
             <a:r>
               <a:rPr lang="ja-JP" altLang="en-US" strike="sngStrike" dirty="0"/>
               <a:t>そこに</a:t>
@@ -10645,8 +10657,8 @@
         </p:nvSpPr>
         <p:spPr>
           <a:xfrm>
-            <a:off x="5883758" y="1806872"/>
-            <a:ext cx="3691882" cy="4522264"/>
+            <a:off x="5883758" y="1879713"/>
+            <a:ext cx="3691882" cy="4376583"/>
           </a:xfrm>
         </p:spPr>
         <p:txBody>
@@ -10654,27 +10666,27 @@
           <a:lstStyle/>
           <a:p>
             <a:r>
-              <a:rPr kumimoji="1" lang="en-US" altLang="ja-JP" dirty="0">
+              <a:rPr kumimoji="1" lang="en-US" altLang="ja-JP" sz="3600" dirty="0">
                 <a:hlinkClick r:id="rId3"/>
               </a:rPr>
               <a:t>Grafana/Loki#847</a:t>
             </a:r>
-            <a:endParaRPr kumimoji="1" lang="en-US" altLang="ja-JP" dirty="0"/>
-          </a:p>
-          <a:p>
-            <a:r>
-              <a:rPr kumimoji="1" lang="ja-JP" altLang="en-US" dirty="0"/>
+            <a:endParaRPr kumimoji="1" lang="en-US" altLang="ja-JP" sz="3600" dirty="0"/>
+          </a:p>
+          <a:p>
+            <a:r>
+              <a:rPr kumimoji="1" lang="ja-JP" altLang="en-US" sz="3600" dirty="0"/>
               <a:t>一般に</a:t>
             </a:r>
             <a:r>
-              <a:rPr kumimoji="1" lang="en-US" altLang="ja-JP" dirty="0"/>
+              <a:rPr kumimoji="1" lang="en-US" altLang="ja-JP" sz="3600" dirty="0"/>
               <a:t>OSS</a:t>
             </a:r>
             <a:r>
-              <a:rPr kumimoji="1" lang="ja-JP" altLang="en-US" dirty="0"/>
+              <a:rPr kumimoji="1" lang="ja-JP" altLang="en-US" sz="3600" dirty="0"/>
               <a:t>にフィードバックする作法に準じればちゃんと見てもらえる</a:t>
             </a:r>
-            <a:endParaRPr kumimoji="1" lang="en-US" altLang="ja-JP" dirty="0"/>
+            <a:endParaRPr kumimoji="1" lang="en-US" altLang="ja-JP" sz="3600" dirty="0"/>
           </a:p>
           <a:p>
             <a:pPr lvl="1"/>
@@ -10822,8 +10834,8 @@
         </p:nvSpPr>
         <p:spPr>
           <a:xfrm>
-            <a:off x="5844002" y="832107"/>
-            <a:ext cx="4172361" cy="5895460"/>
+            <a:off x="5844002" y="1203747"/>
+            <a:ext cx="4172361" cy="5152180"/>
           </a:xfrm>
         </p:spPr>
         <p:txBody>
@@ -10835,10 +10847,10 @@
               <a:buAutoNum type="arabicPeriod"/>
             </a:pPr>
             <a:r>
-              <a:rPr kumimoji="1" lang="ja-JP" altLang="en-US" dirty="0"/>
+              <a:rPr kumimoji="1" lang="ja-JP" altLang="en-US" sz="3200" dirty="0"/>
               <a:t>はっきりとした動機を書く</a:t>
             </a:r>
-            <a:endParaRPr kumimoji="1" lang="en-US" altLang="ja-JP" dirty="0"/>
+            <a:endParaRPr kumimoji="1" lang="en-US" altLang="ja-JP" sz="3200" dirty="0"/>
           </a:p>
           <a:p>
             <a:pPr marL="971550" lvl="1" indent="-514350">
@@ -10887,22 +10899,22 @@
               <a:buAutoNum type="arabicPeriod"/>
             </a:pPr>
             <a:r>
-              <a:rPr lang="ja-JP" altLang="en-US" dirty="0"/>
+              <a:rPr lang="ja-JP" altLang="en-US" sz="3200" dirty="0"/>
               <a:t>関連</a:t>
             </a:r>
             <a:r>
-              <a:rPr kumimoji="1" lang="ja-JP" altLang="en-US" dirty="0"/>
+              <a:rPr kumimoji="1" lang="ja-JP" altLang="en-US" sz="3200" dirty="0"/>
               <a:t>する</a:t>
             </a:r>
             <a:r>
-              <a:rPr kumimoji="1" lang="en-US" altLang="ja-JP" dirty="0"/>
+              <a:rPr kumimoji="1" lang="en-US" altLang="ja-JP" sz="3200" dirty="0"/>
               <a:t>Issue</a:t>
             </a:r>
             <a:r>
-              <a:rPr kumimoji="1" lang="ja-JP" altLang="en-US" dirty="0"/>
+              <a:rPr kumimoji="1" lang="ja-JP" altLang="en-US" sz="3200" dirty="0"/>
               <a:t>チケット番号</a:t>
             </a:r>
-            <a:endParaRPr kumimoji="1" lang="en-US" altLang="ja-JP" dirty="0"/>
+            <a:endParaRPr kumimoji="1" lang="en-US" altLang="ja-JP" sz="3200" dirty="0"/>
           </a:p>
           <a:p>
             <a:pPr marL="971550" lvl="1" indent="-514350">
@@ -10933,10 +10945,10 @@
               <a:buAutoNum type="arabicPeriod"/>
             </a:pPr>
             <a:r>
-              <a:rPr lang="ja-JP" altLang="en-US" dirty="0"/>
+              <a:rPr lang="ja-JP" altLang="en-US" sz="3200" dirty="0"/>
               <a:t>チェックリストがあれば忘れずに埋める</a:t>
             </a:r>
-            <a:endParaRPr lang="en-US" altLang="ja-JP" dirty="0"/>
+            <a:endParaRPr lang="en-US" altLang="ja-JP" sz="3200" dirty="0"/>
           </a:p>
           <a:p>
             <a:pPr marL="971550" lvl="1" indent="-514350">
@@ -11898,8 +11910,8 @@
         </p:nvSpPr>
         <p:spPr>
           <a:xfrm>
-            <a:off x="504000" y="1136899"/>
-            <a:ext cx="8716073" cy="6422776"/>
+            <a:off x="504000" y="1578298"/>
+            <a:ext cx="8716073" cy="5539978"/>
           </a:xfrm>
         </p:spPr>
         <p:txBody>
@@ -11962,6 +11974,10 @@
             <a:endParaRPr lang="en-US" altLang="ja-JP" dirty="0"/>
           </a:p>
           <a:p>
+            <a:pPr marL="571500" indent="-571500">
+              <a:buFont typeface="Arial" panose="020B0604020202020204" pitchFamily="34" charset="0"/>
+              <a:buChar char="•"/>
+            </a:pPr>
             <a:r>
               <a:rPr lang="ja-JP" altLang="en-US" dirty="0"/>
               <a:t>業務</a:t>
@@ -11969,7 +11985,10 @@
             <a:endParaRPr lang="en-US" altLang="ja-JP" dirty="0"/>
           </a:p>
           <a:p>
-            <a:pPr lvl="1"/>
+            <a:pPr marL="285750" lvl="1" indent="-285750">
+              <a:buFont typeface="Arial" panose="020B0604020202020204" pitchFamily="34" charset="0"/>
+              <a:buChar char="•"/>
+            </a:pPr>
             <a:r>
               <a:rPr kumimoji="1" lang="en-US" altLang="ja-JP" dirty="0" err="1"/>
               <a:t>Fluentd</a:t>
@@ -12001,7 +12020,10 @@
             <a:endParaRPr lang="en-US" altLang="ja-JP" dirty="0"/>
           </a:p>
           <a:p>
-            <a:pPr lvl="2"/>
+            <a:pPr marL="285750" lvl="2" indent="-285750">
+              <a:buFont typeface="Arial" panose="020B0604020202020204" pitchFamily="34" charset="0"/>
+              <a:buChar char="•"/>
+            </a:pPr>
             <a:r>
               <a:rPr lang="en-US" altLang="ja-JP" dirty="0" err="1"/>
               <a:t>Fluentd</a:t>
@@ -12029,7 +12051,10 @@
             <a:endParaRPr lang="en-US" altLang="ja-JP" dirty="0"/>
           </a:p>
           <a:p>
-            <a:pPr lvl="2"/>
+            <a:pPr marL="285750" lvl="2" indent="-285750">
+              <a:buFont typeface="Arial" panose="020B0604020202020204" pitchFamily="34" charset="0"/>
+              <a:buChar char="•"/>
+            </a:pPr>
             <a:r>
               <a:rPr lang="en-US" altLang="ja-JP" dirty="0"/>
               <a:t>fluent-plugin-</a:t>
@@ -12041,7 +12066,10 @@
             <a:endParaRPr lang="en-US" altLang="ja-JP" dirty="0"/>
           </a:p>
           <a:p>
-            <a:pPr lvl="2"/>
+            <a:pPr marL="285750" lvl="2" indent="-285750">
+              <a:buFont typeface="Arial" panose="020B0604020202020204" pitchFamily="34" charset="0"/>
+              <a:buChar char="•"/>
+            </a:pPr>
             <a:r>
               <a:rPr lang="en-US" altLang="ja-JP" dirty="0"/>
               <a:t>fluent-plugin-</a:t>
@@ -12053,7 +12081,10 @@
             <a:endParaRPr lang="en-US" altLang="ja-JP" dirty="0"/>
           </a:p>
           <a:p>
-            <a:pPr lvl="2"/>
+            <a:pPr marL="285750" lvl="2" indent="-285750">
+              <a:buFont typeface="Arial" panose="020B0604020202020204" pitchFamily="34" charset="0"/>
+              <a:buChar char="•"/>
+            </a:pPr>
             <a:r>
               <a:rPr lang="en-US" altLang="ja-JP" dirty="0"/>
               <a:t>fluent-plugin-windows-</a:t>
@@ -12068,7 +12099,10 @@
             </a:r>
           </a:p>
           <a:p>
-            <a:pPr lvl="1"/>
+            <a:pPr marL="285750" lvl="1" indent="-285750">
+              <a:buFont typeface="Arial" panose="020B0604020202020204" pitchFamily="34" charset="0"/>
+              <a:buChar char="•"/>
+            </a:pPr>
             <a:r>
               <a:rPr lang="ja-JP" altLang="en-US" dirty="0"/>
               <a:t>産業用半導体メーカーのボードで動く</a:t>
@@ -13499,8 +13533,8 @@
         </p:nvSpPr>
         <p:spPr>
           <a:xfrm>
-            <a:off x="350892" y="882341"/>
-            <a:ext cx="9071640" cy="775597"/>
+            <a:off x="350892" y="826941"/>
+            <a:ext cx="9071640" cy="886397"/>
           </a:xfrm>
         </p:spPr>
         <p:txBody>
@@ -13508,35 +13542,35 @@
           <a:lstStyle/>
           <a:p>
             <a:r>
-              <a:rPr lang="ja-JP" altLang="en-US" dirty="0"/>
+              <a:rPr lang="ja-JP" altLang="en-US" sz="3200" dirty="0"/>
               <a:t>少し待つと、</a:t>
             </a:r>
             <a:r>
-              <a:rPr lang="en-US" altLang="ja-JP" dirty="0"/>
+              <a:rPr lang="en-US" altLang="ja-JP" sz="3200" dirty="0"/>
               <a:t>f</a:t>
             </a:r>
             <a:r>
-              <a:rPr kumimoji="1" lang="en-US" altLang="ja-JP" dirty="0"/>
+              <a:rPr kumimoji="1" lang="en-US" altLang="ja-JP" sz="3200" dirty="0"/>
               <a:t>luent-bit</a:t>
             </a:r>
             <a:r>
-              <a:rPr kumimoji="1" lang="ja-JP" altLang="en-US" dirty="0"/>
+              <a:rPr kumimoji="1" lang="ja-JP" altLang="en-US" sz="3200" dirty="0"/>
               <a:t>で取得した</a:t>
             </a:r>
             <a:r>
-              <a:rPr kumimoji="1" lang="en-US" altLang="ja-JP" dirty="0"/>
+              <a:rPr kumimoji="1" lang="en-US" altLang="ja-JP" sz="3200" dirty="0"/>
               <a:t>CPU</a:t>
             </a:r>
             <a:r>
-              <a:rPr kumimoji="1" lang="ja-JP" altLang="en-US" dirty="0"/>
+              <a:rPr kumimoji="1" lang="ja-JP" altLang="en-US" sz="3200" dirty="0"/>
               <a:t>使用率が</a:t>
             </a:r>
             <a:r>
-              <a:rPr kumimoji="1" lang="en-US" altLang="ja-JP" dirty="0"/>
+              <a:rPr kumimoji="1" lang="en-US" altLang="ja-JP" sz="3200" dirty="0"/>
               <a:t>Loki</a:t>
             </a:r>
             <a:r>
-              <a:rPr kumimoji="1" lang="ja-JP" altLang="en-US" dirty="0"/>
+              <a:rPr kumimoji="1" lang="ja-JP" altLang="en-US" sz="3200" dirty="0"/>
               <a:t>に投入される</a:t>
             </a:r>
           </a:p>
@@ -13659,8 +13693,8 @@
         </p:nvSpPr>
         <p:spPr>
           <a:xfrm>
-            <a:off x="504000" y="2554768"/>
-            <a:ext cx="9071640" cy="3026470"/>
+            <a:off x="504000" y="2766108"/>
+            <a:ext cx="9071640" cy="2603790"/>
           </a:xfrm>
         </p:spPr>
         <p:txBody>
@@ -13674,7 +13708,10 @@
             <a:endParaRPr kumimoji="1" lang="en-US" altLang="ja-JP" dirty="0"/>
           </a:p>
           <a:p>
-            <a:pPr lvl="1"/>
+            <a:pPr marL="285750" lvl="1" indent="-285750">
+              <a:buFont typeface="Arial" panose="020B0604020202020204" pitchFamily="34" charset="0"/>
+              <a:buChar char="•"/>
+            </a:pPr>
             <a:r>
               <a:rPr lang="en-US" altLang="ja-JP" dirty="0"/>
               <a:t>Grafana/Loki</a:t>
@@ -13694,7 +13731,10 @@
             <a:endParaRPr lang="en-US" altLang="ja-JP" dirty="0"/>
           </a:p>
           <a:p>
-            <a:pPr lvl="1"/>
+            <a:pPr marL="285750" lvl="1" indent="-285750">
+              <a:buFont typeface="Arial" panose="020B0604020202020204" pitchFamily="34" charset="0"/>
+              <a:buChar char="•"/>
+            </a:pPr>
             <a:r>
               <a:rPr lang="en-US" altLang="ja-JP" dirty="0"/>
               <a:t>f</a:t>
@@ -13742,7 +13782,10 @@
             <a:endParaRPr lang="en-US" altLang="ja-JP" dirty="0"/>
           </a:p>
           <a:p>
-            <a:pPr lvl="1"/>
+            <a:pPr marL="285750" lvl="1" indent="-285750">
+              <a:buFont typeface="Arial" panose="020B0604020202020204" pitchFamily="34" charset="0"/>
+              <a:buChar char="•"/>
+            </a:pPr>
             <a:r>
               <a:rPr kumimoji="1" lang="en-US" altLang="ja-JP" dirty="0"/>
               <a:t>Grafana/Loki</a:t>
@@ -13770,7 +13813,10 @@
             <a:endParaRPr kumimoji="1" lang="en-US" altLang="ja-JP" dirty="0"/>
           </a:p>
           <a:p>
-            <a:pPr lvl="1"/>
+            <a:pPr marL="285750" lvl="1" indent="-285750">
+              <a:buFont typeface="Arial" panose="020B0604020202020204" pitchFamily="34" charset="0"/>
+              <a:buChar char="•"/>
+            </a:pPr>
             <a:r>
               <a:rPr lang="ja-JP" altLang="en-US" dirty="0"/>
               <a:t>ドキュメントもちゃんと書かれた</a:t>

</xml_diff>